<commit_message>
FINAL ASSESSMENT- 2nd April
</commit_message>
<xml_diff>
--- a/LVADSUSR187_SharveshSubhash.pptx
+++ b/LVADSUSR187_SharveshSubhash.pptx
@@ -13,9 +13,7 @@
     <p:sldId id="285" r:id="rId10"/>
     <p:sldId id="286" r:id="rId11"/>
     <p:sldId id="287" r:id="rId12"/>
-    <p:sldId id="290" r:id="rId13"/>
-    <p:sldId id="288" r:id="rId14"/>
-    <p:sldId id="289" r:id="rId15"/>
+    <p:sldId id="288" r:id="rId13"/>
   </p:sldIdLst>
   <p:sldSz cx="12192000" cy="6858000"/>
   <p:notesSz cx="6858000" cy="9144000"/>
@@ -5988,7 +5986,7 @@
           </a:effectLst>
           <a:extLst>
             <a:ext uri="{91240B29-F687-4f45-9708-019B960494DF}">
-              <a14:hiddenLine xmlns="" xmlns:a14="http://schemas.microsoft.com/office/drawing/2010/main" xmlns:p14="http://schemas.microsoft.com/office/powerpoint/2010/main" xmlns:a16="http://schemas.microsoft.com/office/drawing/2014/main" w="9525">
+              <a14:hiddenLine xmlns:a16="http://schemas.microsoft.com/office/drawing/2014/main" xmlns:p14="http://schemas.microsoft.com/office/powerpoint/2010/main" xmlns:a14="http://schemas.microsoft.com/office/drawing/2010/main" xmlns="" w="9525">
                 <a:solidFill>
                   <a:srgbClr val="000000"/>
                 </a:solidFill>
@@ -6121,330 +6119,6 @@
     <p:extLst>
       <p:ext uri="{BB962C8B-B14F-4D97-AF65-F5344CB8AC3E}">
         <p14:creationId xmlns:p14="http://schemas.microsoft.com/office/powerpoint/2010/main" val="1583120128"/>
-      </p:ext>
-    </p:extLst>
-  </p:cSld>
-  <p:clrMapOvr>
-    <a:masterClrMapping/>
-  </p:clrMapOvr>
-</p:sld>
-</file>
-
-<file path=ppt/slides/slide10.xml><?xml version="1.0" encoding="utf-8"?>
-<p:sld xmlns:a="http://schemas.openxmlformats.org/drawingml/2006/main" xmlns:r="http://schemas.openxmlformats.org/officeDocument/2006/relationships" xmlns:p="http://schemas.openxmlformats.org/presentationml/2006/main">
-  <p:cSld>
-    <p:spTree>
-      <p:nvGrpSpPr>
-        <p:cNvPr id="1" name=""/>
-        <p:cNvGrpSpPr/>
-        <p:nvPr/>
-      </p:nvGrpSpPr>
-      <p:grpSpPr>
-        <a:xfrm>
-          <a:off x="0" y="0"/>
-          <a:ext cx="0" cy="0"/>
-          <a:chOff x="0" y="0"/>
-          <a:chExt cx="0" cy="0"/>
-        </a:xfrm>
-      </p:grpSpPr>
-      <p:sp>
-        <p:nvSpPr>
-          <p:cNvPr id="2" name="Title 1">
-            <a:extLst>
-              <a:ext uri="{FF2B5EF4-FFF2-40B4-BE49-F238E27FC236}">
-                <a16:creationId xmlns:a16="http://schemas.microsoft.com/office/drawing/2014/main" id="{780673DA-BDD9-E6D1-7E4F-8F7B0A6F162C}"/>
-              </a:ext>
-            </a:extLst>
-          </p:cNvPr>
-          <p:cNvSpPr>
-            <a:spLocks noGrp="1"/>
-          </p:cNvSpPr>
-          <p:nvPr>
-            <p:ph type="title"/>
-          </p:nvPr>
-        </p:nvSpPr>
-        <p:spPr/>
-        <p:txBody>
-          <a:bodyPr/>
-          <a:lstStyle/>
-          <a:p>
-            <a:r>
-              <a:rPr lang="en-IN" dirty="0"/>
-              <a:t>Q9</a:t>
-            </a:r>
-          </a:p>
-        </p:txBody>
-      </p:sp>
-      <p:pic>
-        <p:nvPicPr>
-          <p:cNvPr id="4" name="Picture 3">
-            <a:extLst>
-              <a:ext uri="{FF2B5EF4-FFF2-40B4-BE49-F238E27FC236}">
-                <a16:creationId xmlns:a16="http://schemas.microsoft.com/office/drawing/2014/main" id="{0B2FBD42-3337-85DA-F7A6-5D9F120B786B}"/>
-              </a:ext>
-            </a:extLst>
-          </p:cNvPr>
-          <p:cNvPicPr>
-            <a:picLocks noChangeAspect="1"/>
-          </p:cNvPicPr>
-          <p:nvPr/>
-        </p:nvPicPr>
-        <p:blipFill>
-          <a:blip r:embed="rId2"/>
-          <a:stretch>
-            <a:fillRect/>
-          </a:stretch>
-        </p:blipFill>
-        <p:spPr>
-          <a:xfrm>
-            <a:off x="913795" y="1641767"/>
-            <a:ext cx="3591426" cy="4915586"/>
-          </a:xfrm>
-          <a:prstGeom prst="rect">
-            <a:avLst/>
-          </a:prstGeom>
-        </p:spPr>
-      </p:pic>
-      <p:pic>
-        <p:nvPicPr>
-          <p:cNvPr id="6" name="Picture 5">
-            <a:extLst>
-              <a:ext uri="{FF2B5EF4-FFF2-40B4-BE49-F238E27FC236}">
-                <a16:creationId xmlns:a16="http://schemas.microsoft.com/office/drawing/2014/main" id="{5690766B-7716-F4F4-4F16-3DDE19037466}"/>
-              </a:ext>
-            </a:extLst>
-          </p:cNvPr>
-          <p:cNvPicPr>
-            <a:picLocks noChangeAspect="1"/>
-          </p:cNvPicPr>
-          <p:nvPr/>
-        </p:nvPicPr>
-        <p:blipFill>
-          <a:blip r:embed="rId3"/>
-          <a:stretch>
-            <a:fillRect/>
-          </a:stretch>
-        </p:blipFill>
-        <p:spPr>
-          <a:xfrm>
-            <a:off x="4627001" y="1641767"/>
-            <a:ext cx="3486637" cy="4391638"/>
-          </a:xfrm>
-          <a:prstGeom prst="rect">
-            <a:avLst/>
-          </a:prstGeom>
-        </p:spPr>
-      </p:pic>
-      <p:pic>
-        <p:nvPicPr>
-          <p:cNvPr id="8" name="Picture 7">
-            <a:extLst>
-              <a:ext uri="{FF2B5EF4-FFF2-40B4-BE49-F238E27FC236}">
-                <a16:creationId xmlns:a16="http://schemas.microsoft.com/office/drawing/2014/main" id="{F3699959-C8F7-8ADE-439C-26FF4E9A4352}"/>
-              </a:ext>
-            </a:extLst>
-          </p:cNvPr>
-          <p:cNvPicPr>
-            <a:picLocks noChangeAspect="1"/>
-          </p:cNvPicPr>
-          <p:nvPr/>
-        </p:nvPicPr>
-        <p:blipFill>
-          <a:blip r:embed="rId4"/>
-          <a:stretch>
-            <a:fillRect/>
-          </a:stretch>
-        </p:blipFill>
-        <p:spPr>
-          <a:xfrm>
-            <a:off x="8235418" y="1697175"/>
-            <a:ext cx="3248478" cy="2514951"/>
-          </a:xfrm>
-          <a:prstGeom prst="rect">
-            <a:avLst/>
-          </a:prstGeom>
-        </p:spPr>
-      </p:pic>
-      <p:sp>
-        <p:nvSpPr>
-          <p:cNvPr id="9" name="TextBox 8">
-            <a:extLst>
-              <a:ext uri="{FF2B5EF4-FFF2-40B4-BE49-F238E27FC236}">
-                <a16:creationId xmlns:a16="http://schemas.microsoft.com/office/drawing/2014/main" id="{907905FD-FAAC-0C0D-71E5-96917F5088AF}"/>
-              </a:ext>
-            </a:extLst>
-          </p:cNvPr>
-          <p:cNvSpPr txBox="1"/>
-          <p:nvPr/>
-        </p:nvSpPr>
-        <p:spPr>
-          <a:xfrm>
-            <a:off x="8363490" y="4514494"/>
-            <a:ext cx="3120406" cy="646331"/>
-          </a:xfrm>
-          <a:prstGeom prst="rect">
-            <a:avLst/>
-          </a:prstGeom>
-          <a:noFill/>
-        </p:spPr>
-        <p:txBody>
-          <a:bodyPr wrap="none" rtlCol="0">
-            <a:spAutoFit/>
-          </a:bodyPr>
-          <a:lstStyle/>
-          <a:p>
-            <a:r>
-              <a:rPr lang="en-IN" dirty="0"/>
-              <a:t>There is clearly good ethnic </a:t>
-            </a:r>
-          </a:p>
-          <a:p>
-            <a:r>
-              <a:rPr lang="en-IN" dirty="0"/>
-              <a:t>Diversity in each department</a:t>
-            </a:r>
-          </a:p>
-        </p:txBody>
-      </p:sp>
-    </p:spTree>
-    <p:extLst>
-      <p:ext uri="{BB962C8B-B14F-4D97-AF65-F5344CB8AC3E}">
-        <p14:creationId xmlns:p14="http://schemas.microsoft.com/office/powerpoint/2010/main" val="580357240"/>
-      </p:ext>
-    </p:extLst>
-  </p:cSld>
-  <p:clrMapOvr>
-    <a:masterClrMapping/>
-  </p:clrMapOvr>
-</p:sld>
-</file>
-
-<file path=ppt/slides/slide11.xml><?xml version="1.0" encoding="utf-8"?>
-<p:sld xmlns:a="http://schemas.openxmlformats.org/drawingml/2006/main" xmlns:r="http://schemas.openxmlformats.org/officeDocument/2006/relationships" xmlns:p="http://schemas.openxmlformats.org/presentationml/2006/main">
-  <p:cSld>
-    <p:spTree>
-      <p:nvGrpSpPr>
-        <p:cNvPr id="1" name=""/>
-        <p:cNvGrpSpPr/>
-        <p:nvPr/>
-      </p:nvGrpSpPr>
-      <p:grpSpPr>
-        <a:xfrm>
-          <a:off x="0" y="0"/>
-          <a:ext cx="0" cy="0"/>
-          <a:chOff x="0" y="0"/>
-          <a:chExt cx="0" cy="0"/>
-        </a:xfrm>
-      </p:grpSpPr>
-      <p:sp>
-        <p:nvSpPr>
-          <p:cNvPr id="2" name="Title 1">
-            <a:extLst>
-              <a:ext uri="{FF2B5EF4-FFF2-40B4-BE49-F238E27FC236}">
-                <a16:creationId xmlns:a16="http://schemas.microsoft.com/office/drawing/2014/main" id="{3499FA7C-406D-9370-0CBF-96F8757B4FB3}"/>
-              </a:ext>
-            </a:extLst>
-          </p:cNvPr>
-          <p:cNvSpPr>
-            <a:spLocks noGrp="1"/>
-          </p:cNvSpPr>
-          <p:nvPr>
-            <p:ph type="title"/>
-          </p:nvPr>
-        </p:nvSpPr>
-        <p:spPr/>
-        <p:txBody>
-          <a:bodyPr/>
-          <a:lstStyle/>
-          <a:p>
-            <a:r>
-              <a:rPr lang="en-IN" dirty="0"/>
-              <a:t>Q10</a:t>
-            </a:r>
-          </a:p>
-        </p:txBody>
-      </p:sp>
-      <p:pic>
-        <p:nvPicPr>
-          <p:cNvPr id="4" name="Picture 3">
-            <a:extLst>
-              <a:ext uri="{FF2B5EF4-FFF2-40B4-BE49-F238E27FC236}">
-                <a16:creationId xmlns:a16="http://schemas.microsoft.com/office/drawing/2014/main" id="{907AFEC3-B6F9-5B2E-353F-4E81F7C3CF32}"/>
-              </a:ext>
-            </a:extLst>
-          </p:cNvPr>
-          <p:cNvPicPr>
-            <a:picLocks noChangeAspect="1"/>
-          </p:cNvPicPr>
-          <p:nvPr/>
-        </p:nvPicPr>
-        <p:blipFill>
-          <a:blip r:embed="rId2"/>
-          <a:stretch>
-            <a:fillRect/>
-          </a:stretch>
-        </p:blipFill>
-        <p:spPr>
-          <a:xfrm>
-            <a:off x="751840" y="1820451"/>
-            <a:ext cx="7664468" cy="4831268"/>
-          </a:xfrm>
-          <a:prstGeom prst="rect">
-            <a:avLst/>
-          </a:prstGeom>
-        </p:spPr>
-      </p:pic>
-      <p:sp>
-        <p:nvSpPr>
-          <p:cNvPr id="5" name="TextBox 4">
-            <a:extLst>
-              <a:ext uri="{FF2B5EF4-FFF2-40B4-BE49-F238E27FC236}">
-                <a16:creationId xmlns:a16="http://schemas.microsoft.com/office/drawing/2014/main" id="{FCED7D05-61DA-A956-2880-4A9476E5C736}"/>
-              </a:ext>
-            </a:extLst>
-          </p:cNvPr>
-          <p:cNvSpPr txBox="1"/>
-          <p:nvPr/>
-        </p:nvSpPr>
-        <p:spPr>
-          <a:xfrm>
-            <a:off x="9022080" y="3677920"/>
-            <a:ext cx="3189206" cy="923330"/>
-          </a:xfrm>
-          <a:prstGeom prst="rect">
-            <a:avLst/>
-          </a:prstGeom>
-          <a:noFill/>
-        </p:spPr>
-        <p:txBody>
-          <a:bodyPr wrap="none" rtlCol="0">
-            <a:spAutoFit/>
-          </a:bodyPr>
-          <a:lstStyle/>
-          <a:p>
-            <a:r>
-              <a:rPr lang="en-IN" dirty="0"/>
-              <a:t>Clearly, there is quite a lot</a:t>
-            </a:r>
-          </a:p>
-          <a:p>
-            <a:r>
-              <a:rPr lang="en-IN" dirty="0"/>
-              <a:t>Of hires in the last few years, </a:t>
-            </a:r>
-          </a:p>
-          <a:p>
-            <a:r>
-              <a:rPr lang="en-IN" dirty="0"/>
-              <a:t>Around 220.</a:t>
-            </a:r>
-          </a:p>
-        </p:txBody>
-      </p:sp>
-    </p:spTree>
-    <p:extLst>
-      <p:ext uri="{BB962C8B-B14F-4D97-AF65-F5344CB8AC3E}">
-        <p14:creationId xmlns:p14="http://schemas.microsoft.com/office/powerpoint/2010/main" val="1611947355"/>
       </p:ext>
     </p:extLst>
   </p:cSld>
@@ -7415,7 +7089,7 @@
           <p:cNvPr id="2" name="Title 1">
             <a:extLst>
               <a:ext uri="{FF2B5EF4-FFF2-40B4-BE49-F238E27FC236}">
-                <a16:creationId xmlns:a16="http://schemas.microsoft.com/office/drawing/2014/main" id="{4D62C332-B4F9-3375-DB54-186B8A409B9C}"/>
+                <a16:creationId xmlns:a16="http://schemas.microsoft.com/office/drawing/2014/main" id="{780673DA-BDD9-E6D1-7E4F-8F7B0A6F162C}"/>
               </a:ext>
             </a:extLst>
           </p:cNvPr>
@@ -7432,43 +7106,8 @@
           <a:lstStyle/>
           <a:p>
             <a:r>
-              <a:rPr lang="en-IN" dirty="0"/>
+              <a:rPr lang="en-IN"/>
               <a:t>Q8</a:t>
-            </a:r>
-          </a:p>
-        </p:txBody>
-      </p:sp>
-      <p:sp>
-        <p:nvSpPr>
-          <p:cNvPr id="3" name="TextBox 2">
-            <a:extLst>
-              <a:ext uri="{FF2B5EF4-FFF2-40B4-BE49-F238E27FC236}">
-                <a16:creationId xmlns:a16="http://schemas.microsoft.com/office/drawing/2014/main" id="{0154DD5B-0D99-8FA8-824F-FAC62F854E4C}"/>
-              </a:ext>
-            </a:extLst>
-          </p:cNvPr>
-          <p:cNvSpPr txBox="1"/>
-          <p:nvPr/>
-        </p:nvSpPr>
-        <p:spPr>
-          <a:xfrm>
-            <a:off x="2804160" y="2509520"/>
-            <a:ext cx="5796651" cy="369332"/>
-          </a:xfrm>
-          <a:prstGeom prst="rect">
-            <a:avLst/>
-          </a:prstGeom>
-          <a:noFill/>
-        </p:spPr>
-        <p:txBody>
-          <a:bodyPr wrap="none" rtlCol="0">
-            <a:spAutoFit/>
-          </a:bodyPr>
-          <a:lstStyle/>
-          <a:p>
-            <a:r>
-              <a:rPr lang="en-IN" dirty="0"/>
-              <a:t>There is no data to get inference on reasons for leaving</a:t>
             </a:r>
           </a:p>
         </p:txBody>
@@ -7476,7 +7115,7 @@
     </p:spTree>
     <p:extLst>
       <p:ext uri="{BB962C8B-B14F-4D97-AF65-F5344CB8AC3E}">
-        <p14:creationId xmlns:p14="http://schemas.microsoft.com/office/powerpoint/2010/main" val="4187807667"/>
+        <p14:creationId xmlns:p14="http://schemas.microsoft.com/office/powerpoint/2010/main" val="580357240"/>
       </p:ext>
     </p:extLst>
   </p:cSld>
@@ -7669,21 +7308,21 @@
 </file>
 
 <file path=customXml/item1.xml><?xml version="1.0" encoding="utf-8"?>
+<p:properties xmlns:p="http://schemas.microsoft.com/office/2006/metadata/properties" xmlns:xsi="http://www.w3.org/2001/XMLSchema-instance" xmlns:pc="http://schemas.microsoft.com/office/infopath/2007/PartnerControls">
+  <documentManagement>
+    <Status xmlns="71af3243-3dd4-4a8d-8c0d-dd76da1f02a5">Not started</Status>
+    <MediaServiceKeyPoints xmlns="71af3243-3dd4-4a8d-8c0d-dd76da1f02a5" xsi:nil="true"/>
+  </documentManagement>
+</p:properties>
+</file>
+
+<file path=customXml/item2.xml><?xml version="1.0" encoding="utf-8"?>
 <?mso-contentType ?>
 <FormTemplates xmlns="http://schemas.microsoft.com/sharepoint/v3/contenttype/forms">
   <Display>DocumentLibraryForm</Display>
   <Edit>DocumentLibraryForm</Edit>
   <New>DocumentLibraryForm</New>
 </FormTemplates>
-</file>
-
-<file path=customXml/item2.xml><?xml version="1.0" encoding="utf-8"?>
-<p:properties xmlns:p="http://schemas.microsoft.com/office/2006/metadata/properties" xmlns:xsi="http://www.w3.org/2001/XMLSchema-instance" xmlns:pc="http://schemas.microsoft.com/office/infopath/2007/PartnerControls">
-  <documentManagement>
-    <Status xmlns="71af3243-3dd4-4a8d-8c0d-dd76da1f02a5">Not started</Status>
-    <MediaServiceKeyPoints xmlns="71af3243-3dd4-4a8d-8c0d-dd76da1f02a5" xsi:nil="true"/>
-  </documentManagement>
-</p:properties>
 </file>
 
 <file path=customXml/item3.xml><?xml version="1.0" encoding="utf-8"?>
@@ -7908,19 +7547,19 @@
 </file>
 
 <file path=customXml/itemProps1.xml><?xml version="1.0" encoding="utf-8"?>
-<ds:datastoreItem xmlns:ds="http://schemas.openxmlformats.org/officeDocument/2006/customXml" ds:itemID="{30CB38EC-895A-4F8F-8F75-E263501ABB5A}">
+<ds:datastoreItem xmlns:ds="http://schemas.openxmlformats.org/officeDocument/2006/customXml" ds:itemID="{F7E70FC5-1855-47AB-8CE1-CB3C873A8988}">
   <ds:schemaRefs>
-    <ds:schemaRef ds:uri="http://schemas.microsoft.com/sharepoint/v3/contenttype/forms"/>
+    <ds:schemaRef ds:uri="http://schemas.microsoft.com/office/2006/metadata/properties"/>
+    <ds:schemaRef ds:uri="http://schemas.microsoft.com/office/infopath/2007/PartnerControls"/>
+    <ds:schemaRef ds:uri="71af3243-3dd4-4a8d-8c0d-dd76da1f02a5"/>
   </ds:schemaRefs>
 </ds:datastoreItem>
 </file>
 
 <file path=customXml/itemProps2.xml><?xml version="1.0" encoding="utf-8"?>
-<ds:datastoreItem xmlns:ds="http://schemas.openxmlformats.org/officeDocument/2006/customXml" ds:itemID="{F7E70FC5-1855-47AB-8CE1-CB3C873A8988}">
+<ds:datastoreItem xmlns:ds="http://schemas.openxmlformats.org/officeDocument/2006/customXml" ds:itemID="{30CB38EC-895A-4F8F-8F75-E263501ABB5A}">
   <ds:schemaRefs>
-    <ds:schemaRef ds:uri="http://schemas.microsoft.com/office/2006/metadata/properties"/>
-    <ds:schemaRef ds:uri="http://schemas.microsoft.com/office/infopath/2007/PartnerControls"/>
-    <ds:schemaRef ds:uri="71af3243-3dd4-4a8d-8c0d-dd76da1f02a5"/>
+    <ds:schemaRef ds:uri="http://schemas.microsoft.com/sharepoint/v3/contenttype/forms"/>
   </ds:schemaRefs>
 </ds:datastoreItem>
 </file>

</xml_diff>